<commit_message>
Update Flujo de Trabajo - Web.pptx
</commit_message>
<xml_diff>
--- a/Flujo de Trabajo/Flujo de Trabajo - Web.pptx
+++ b/Flujo de Trabajo/Flujo de Trabajo - Web.pptx
@@ -16,6 +16,7 @@
     <p:sldId id="265" r:id="rId10"/>
     <p:sldId id="266" r:id="rId11"/>
     <p:sldId id="267" r:id="rId12"/>
+    <p:sldId id="268" r:id="rId13"/>
   </p:sldIdLst>
   <p:sldSz cx="12192000" cy="6858000"/>
   <p:notesSz cx="6858000" cy="9144000"/>
@@ -114,6 +115,11 @@
       </a:defRPr>
     </a:lvl9pPr>
   </p:defaultTextStyle>
+  <p:extLst>
+    <p:ext uri="{EFAFB233-063F-42B5-8137-9DF3F51BA10A}">
+      <p15:sldGuideLst xmlns:p15="http://schemas.microsoft.com/office/powerpoint/2012/main"/>
+    </p:ext>
+  </p:extLst>
 </p:presentation>
 </file>
 
@@ -3362,7 +3368,13 @@
               <a:rPr lang="es-ES" dirty="0" smtClean="0">
                 <a:hlinkClick r:id="rId2"/>
               </a:rPr>
-              <a:t>https://fonts.google.com/</a:t>
+              <a:t>https://fonts.google.com</a:t>
+            </a:r>
+            <a:r>
+              <a:rPr lang="es-ES" dirty="0" smtClean="0">
+                <a:hlinkClick r:id="rId2"/>
+              </a:rPr>
+              <a:t>/</a:t>
             </a:r>
             <a:endParaRPr lang="es-ES" dirty="0" smtClean="0"/>
           </a:p>
@@ -3595,6 +3607,258 @@
           </a:fontRef>
         </p:style>
       </p:cxnSp>
+      <p:sp>
+        <p:nvSpPr>
+          <p:cNvPr id="11" name="Marcador de contenido 2"/>
+          <p:cNvSpPr txBox="1">
+            <a:spLocks/>
+          </p:cNvSpPr>
+          <p:nvPr/>
+        </p:nvSpPr>
+        <p:spPr>
+          <a:xfrm>
+            <a:off x="1009650" y="4639101"/>
+            <a:ext cx="3939540" cy="2080687"/>
+          </a:xfrm>
+          <a:prstGeom prst="rect">
+            <a:avLst/>
+          </a:prstGeom>
+          <a:solidFill>
+            <a:srgbClr val="F4A6B7"/>
+          </a:solidFill>
+        </p:spPr>
+        <p:txBody>
+          <a:bodyPr vert="horz" lIns="91440" tIns="45720" rIns="91440" bIns="45720" rtlCol="0" anchor="ctr">
+            <a:noAutofit/>
+          </a:bodyPr>
+          <a:lstStyle>
+            <a:lvl1pPr marL="228600" indent="-228600" algn="l" defTabSz="914400" rtl="0" eaLnBrk="1" latinLnBrk="0" hangingPunct="1">
+              <a:lnSpc>
+                <a:spcPct val="90000"/>
+              </a:lnSpc>
+              <a:spcBef>
+                <a:spcPts val="1000"/>
+              </a:spcBef>
+              <a:buFont typeface="Arial" panose="020B0604020202020204" pitchFamily="34" charset="0"/>
+              <a:buChar char="•"/>
+              <a:defRPr sz="2800" kern="1200">
+                <a:solidFill>
+                  <a:schemeClr val="tx1"/>
+                </a:solidFill>
+                <a:latin typeface="+mn-lt"/>
+                <a:ea typeface="+mn-ea"/>
+                <a:cs typeface="+mn-cs"/>
+              </a:defRPr>
+            </a:lvl1pPr>
+            <a:lvl2pPr marL="685800" indent="-228600" algn="l" defTabSz="914400" rtl="0" eaLnBrk="1" latinLnBrk="0" hangingPunct="1">
+              <a:lnSpc>
+                <a:spcPct val="90000"/>
+              </a:lnSpc>
+              <a:spcBef>
+                <a:spcPts val="500"/>
+              </a:spcBef>
+              <a:buFont typeface="Arial" panose="020B0604020202020204" pitchFamily="34" charset="0"/>
+              <a:buChar char="•"/>
+              <a:defRPr sz="2400" kern="1200">
+                <a:solidFill>
+                  <a:schemeClr val="tx1"/>
+                </a:solidFill>
+                <a:latin typeface="+mn-lt"/>
+                <a:ea typeface="+mn-ea"/>
+                <a:cs typeface="+mn-cs"/>
+              </a:defRPr>
+            </a:lvl2pPr>
+            <a:lvl3pPr marL="1143000" indent="-228600" algn="l" defTabSz="914400" rtl="0" eaLnBrk="1" latinLnBrk="0" hangingPunct="1">
+              <a:lnSpc>
+                <a:spcPct val="90000"/>
+              </a:lnSpc>
+              <a:spcBef>
+                <a:spcPts val="500"/>
+              </a:spcBef>
+              <a:buFont typeface="Arial" panose="020B0604020202020204" pitchFamily="34" charset="0"/>
+              <a:buChar char="•"/>
+              <a:defRPr sz="2000" kern="1200">
+                <a:solidFill>
+                  <a:schemeClr val="tx1"/>
+                </a:solidFill>
+                <a:latin typeface="+mn-lt"/>
+                <a:ea typeface="+mn-ea"/>
+                <a:cs typeface="+mn-cs"/>
+              </a:defRPr>
+            </a:lvl3pPr>
+            <a:lvl4pPr marL="1600200" indent="-228600" algn="l" defTabSz="914400" rtl="0" eaLnBrk="1" latinLnBrk="0" hangingPunct="1">
+              <a:lnSpc>
+                <a:spcPct val="90000"/>
+              </a:lnSpc>
+              <a:spcBef>
+                <a:spcPts val="500"/>
+              </a:spcBef>
+              <a:buFont typeface="Arial" panose="020B0604020202020204" pitchFamily="34" charset="0"/>
+              <a:buChar char="•"/>
+              <a:defRPr sz="1800" kern="1200">
+                <a:solidFill>
+                  <a:schemeClr val="tx1"/>
+                </a:solidFill>
+                <a:latin typeface="+mn-lt"/>
+                <a:ea typeface="+mn-ea"/>
+                <a:cs typeface="+mn-cs"/>
+              </a:defRPr>
+            </a:lvl4pPr>
+            <a:lvl5pPr marL="2057400" indent="-228600" algn="l" defTabSz="914400" rtl="0" eaLnBrk="1" latinLnBrk="0" hangingPunct="1">
+              <a:lnSpc>
+                <a:spcPct val="90000"/>
+              </a:lnSpc>
+              <a:spcBef>
+                <a:spcPts val="500"/>
+              </a:spcBef>
+              <a:buFont typeface="Arial" panose="020B0604020202020204" pitchFamily="34" charset="0"/>
+              <a:buChar char="•"/>
+              <a:defRPr sz="1800" kern="1200">
+                <a:solidFill>
+                  <a:schemeClr val="tx1"/>
+                </a:solidFill>
+                <a:latin typeface="+mn-lt"/>
+                <a:ea typeface="+mn-ea"/>
+                <a:cs typeface="+mn-cs"/>
+              </a:defRPr>
+            </a:lvl5pPr>
+            <a:lvl6pPr marL="2514600" indent="-228600" algn="l" defTabSz="914400" rtl="0" eaLnBrk="1" latinLnBrk="0" hangingPunct="1">
+              <a:lnSpc>
+                <a:spcPct val="90000"/>
+              </a:lnSpc>
+              <a:spcBef>
+                <a:spcPts val="500"/>
+              </a:spcBef>
+              <a:buFont typeface="Arial" panose="020B0604020202020204" pitchFamily="34" charset="0"/>
+              <a:buChar char="•"/>
+              <a:defRPr sz="1800" kern="1200">
+                <a:solidFill>
+                  <a:schemeClr val="tx1"/>
+                </a:solidFill>
+                <a:latin typeface="+mn-lt"/>
+                <a:ea typeface="+mn-ea"/>
+                <a:cs typeface="+mn-cs"/>
+              </a:defRPr>
+            </a:lvl6pPr>
+            <a:lvl7pPr marL="2971800" indent="-228600" algn="l" defTabSz="914400" rtl="0" eaLnBrk="1" latinLnBrk="0" hangingPunct="1">
+              <a:lnSpc>
+                <a:spcPct val="90000"/>
+              </a:lnSpc>
+              <a:spcBef>
+                <a:spcPts val="500"/>
+              </a:spcBef>
+              <a:buFont typeface="Arial" panose="020B0604020202020204" pitchFamily="34" charset="0"/>
+              <a:buChar char="•"/>
+              <a:defRPr sz="1800" kern="1200">
+                <a:solidFill>
+                  <a:schemeClr val="tx1"/>
+                </a:solidFill>
+                <a:latin typeface="+mn-lt"/>
+                <a:ea typeface="+mn-ea"/>
+                <a:cs typeface="+mn-cs"/>
+              </a:defRPr>
+            </a:lvl7pPr>
+            <a:lvl8pPr marL="3429000" indent="-228600" algn="l" defTabSz="914400" rtl="0" eaLnBrk="1" latinLnBrk="0" hangingPunct="1">
+              <a:lnSpc>
+                <a:spcPct val="90000"/>
+              </a:lnSpc>
+              <a:spcBef>
+                <a:spcPts val="500"/>
+              </a:spcBef>
+              <a:buFont typeface="Arial" panose="020B0604020202020204" pitchFamily="34" charset="0"/>
+              <a:buChar char="•"/>
+              <a:defRPr sz="1800" kern="1200">
+                <a:solidFill>
+                  <a:schemeClr val="tx1"/>
+                </a:solidFill>
+                <a:latin typeface="+mn-lt"/>
+                <a:ea typeface="+mn-ea"/>
+                <a:cs typeface="+mn-cs"/>
+              </a:defRPr>
+            </a:lvl8pPr>
+            <a:lvl9pPr marL="3886200" indent="-228600" algn="l" defTabSz="914400" rtl="0" eaLnBrk="1" latinLnBrk="0" hangingPunct="1">
+              <a:lnSpc>
+                <a:spcPct val="90000"/>
+              </a:lnSpc>
+              <a:spcBef>
+                <a:spcPts val="500"/>
+              </a:spcBef>
+              <a:buFont typeface="Arial" panose="020B0604020202020204" pitchFamily="34" charset="0"/>
+              <a:buChar char="•"/>
+              <a:defRPr sz="1800" kern="1200">
+                <a:solidFill>
+                  <a:schemeClr val="tx1"/>
+                </a:solidFill>
+                <a:latin typeface="+mn-lt"/>
+                <a:ea typeface="+mn-ea"/>
+                <a:cs typeface="+mn-cs"/>
+              </a:defRPr>
+            </a:lvl9pPr>
+          </a:lstStyle>
+          <a:p>
+            <a:pPr marL="0" indent="0" algn="just">
+              <a:buNone/>
+            </a:pPr>
+            <a:r>
+              <a:rPr lang="es-ES" sz="1500" dirty="0" smtClean="0"/>
+              <a:t>Variables de fuentes:</a:t>
+            </a:r>
+          </a:p>
+          <a:p>
+            <a:pPr marL="0" indent="0" algn="just">
+              <a:buNone/>
+            </a:pPr>
+            <a:r>
+              <a:rPr lang="es-ES" sz="1500" dirty="0" smtClean="0"/>
+              <a:t>--font-size-small:20px;</a:t>
+            </a:r>
+          </a:p>
+          <a:p>
+            <a:pPr marL="0" indent="0" algn="just">
+              <a:buNone/>
+            </a:pPr>
+            <a:r>
+              <a:rPr lang="es-ES" sz="1500" dirty="0"/>
+              <a:t>--</a:t>
+            </a:r>
+            <a:r>
+              <a:rPr lang="es-ES" sz="1500" dirty="0" smtClean="0"/>
+              <a:t>font-size-medium:30px;</a:t>
+            </a:r>
+          </a:p>
+          <a:p>
+            <a:pPr marL="0" indent="0" algn="just">
+              <a:buNone/>
+            </a:pPr>
+            <a:r>
+              <a:rPr lang="es-ES" sz="1500" dirty="0"/>
+              <a:t>--</a:t>
+            </a:r>
+            <a:r>
+              <a:rPr lang="es-ES" sz="1500" dirty="0" smtClean="0"/>
+              <a:t>font-size-large:35px</a:t>
+            </a:r>
+            <a:r>
+              <a:rPr lang="es-ES" sz="1500" dirty="0"/>
+              <a:t>;</a:t>
+            </a:r>
+          </a:p>
+          <a:p>
+            <a:pPr marL="0" indent="0" algn="just">
+              <a:buNone/>
+            </a:pPr>
+            <a:r>
+              <a:rPr lang="es-ES" sz="1500" dirty="0"/>
+              <a:t>--</a:t>
+            </a:r>
+            <a:r>
+              <a:rPr lang="es-ES" sz="1500" dirty="0" smtClean="0"/>
+              <a:t>font-size-extra-large:50px;</a:t>
+            </a:r>
+            <a:endParaRPr lang="es-ES" sz="1500" dirty="0"/>
+          </a:p>
+        </p:txBody>
+      </p:sp>
     </p:spTree>
     <p:extLst>
       <p:ext uri="{BB962C8B-B14F-4D97-AF65-F5344CB8AC3E}">
@@ -3612,6 +3876,82 @@
       </p:par>
     </p:tnLst>
   </p:timing>
+</p:sld>
+</file>
+
+<file path=ppt/slides/slide12.xml><?xml version="1.0" encoding="utf-8"?>
+<p:sld xmlns:a="http://schemas.openxmlformats.org/drawingml/2006/main" xmlns:r="http://schemas.openxmlformats.org/officeDocument/2006/relationships" xmlns:p="http://schemas.openxmlformats.org/presentationml/2006/main">
+  <p:cSld>
+    <p:spTree>
+      <p:nvGrpSpPr>
+        <p:cNvPr id="1" name=""/>
+        <p:cNvGrpSpPr/>
+        <p:nvPr/>
+      </p:nvGrpSpPr>
+      <p:grpSpPr>
+        <a:xfrm>
+          <a:off x="0" y="0"/>
+          <a:ext cx="0" cy="0"/>
+          <a:chOff x="0" y="0"/>
+          <a:chExt cx="0" cy="0"/>
+        </a:xfrm>
+      </p:grpSpPr>
+      <p:pic>
+        <p:nvPicPr>
+          <p:cNvPr id="3" name="Imagen 2"/>
+          <p:cNvPicPr>
+            <a:picLocks noChangeAspect="1"/>
+          </p:cNvPicPr>
+          <p:nvPr/>
+        </p:nvPicPr>
+        <p:blipFill rotWithShape="1">
+          <a:blip r:embed="rId2"/>
+          <a:srcRect t="2" b="56432"/>
+          <a:stretch/>
+        </p:blipFill>
+        <p:spPr>
+          <a:xfrm>
+            <a:off x="837877" y="0"/>
+            <a:ext cx="5656655" cy="6858000"/>
+          </a:xfrm>
+          <a:prstGeom prst="rect">
+            <a:avLst/>
+          </a:prstGeom>
+        </p:spPr>
+      </p:pic>
+      <p:pic>
+        <p:nvPicPr>
+          <p:cNvPr id="4" name="Imagen 3"/>
+          <p:cNvPicPr>
+            <a:picLocks noChangeAspect="1"/>
+          </p:cNvPicPr>
+          <p:nvPr/>
+        </p:nvPicPr>
+        <p:blipFill rotWithShape="1">
+          <a:blip r:embed="rId2"/>
+          <a:srcRect l="284" t="44001" r="-284" b="62"/>
+          <a:stretch/>
+        </p:blipFill>
+        <p:spPr>
+          <a:xfrm>
+            <a:off x="6908477" y="25400"/>
+            <a:ext cx="4389437" cy="6832600"/>
+          </a:xfrm>
+          <a:prstGeom prst="rect">
+            <a:avLst/>
+          </a:prstGeom>
+        </p:spPr>
+      </p:pic>
+    </p:spTree>
+    <p:extLst>
+      <p:ext uri="{BB962C8B-B14F-4D97-AF65-F5344CB8AC3E}">
+        <p14:creationId xmlns:p14="http://schemas.microsoft.com/office/powerpoint/2010/main" val="2944329731"/>
+      </p:ext>
+    </p:extLst>
+  </p:cSld>
+  <p:clrMapOvr>
+    <a:masterClrMapping/>
+  </p:clrMapOvr>
 </p:sld>
 </file>
 

</xml_diff>